<commit_message>
Update UserGuide, DeveloperGuide, PPP and diagrams for search
</commit_message>
<xml_diff>
--- a/docs/diagrams/Command_Search_SequenceDiagram.pptx
+++ b/docs/diagrams/Command_Search_SequenceDiagram.pptx
@@ -208,7 +208,7 @@
           <a:p>
             <a:fld id="{F5CC4B3F-88C1-4FFA-B1B6-F41C21DC6924}" type="datetimeFigureOut">
               <a:rPr lang="en-US" smtClean="0"/>
-              <a:t>3/29/2019</a:t>
+              <a:t>4/13/2019</a:t>
             </a:fld>
             <a:endParaRPr lang="en-US"/>
           </a:p>
@@ -738,7 +738,7 @@
           <a:p>
             <a:fld id="{78C97017-6FC3-485B-9764-EAC9E56C1D49}" type="datetimeFigureOut">
               <a:rPr lang="en-US" smtClean="0"/>
-              <a:t>3/29/2019</a:t>
+              <a:t>4/13/2019</a:t>
             </a:fld>
             <a:endParaRPr lang="en-US"/>
           </a:p>
@@ -906,7 +906,7 @@
           <a:p>
             <a:fld id="{78C97017-6FC3-485B-9764-EAC9E56C1D49}" type="datetimeFigureOut">
               <a:rPr lang="en-US" smtClean="0"/>
-              <a:t>3/29/2019</a:t>
+              <a:t>4/13/2019</a:t>
             </a:fld>
             <a:endParaRPr lang="en-US"/>
           </a:p>
@@ -1084,7 +1084,7 @@
           <a:p>
             <a:fld id="{78C97017-6FC3-485B-9764-EAC9E56C1D49}" type="datetimeFigureOut">
               <a:rPr lang="en-US" smtClean="0"/>
-              <a:t>3/29/2019</a:t>
+              <a:t>4/13/2019</a:t>
             </a:fld>
             <a:endParaRPr lang="en-US"/>
           </a:p>
@@ -1252,7 +1252,7 @@
           <a:p>
             <a:fld id="{78C97017-6FC3-485B-9764-EAC9E56C1D49}" type="datetimeFigureOut">
               <a:rPr lang="en-US" smtClean="0"/>
-              <a:t>3/29/2019</a:t>
+              <a:t>4/13/2019</a:t>
             </a:fld>
             <a:endParaRPr lang="en-US"/>
           </a:p>
@@ -1497,7 +1497,7 @@
           <a:p>
             <a:fld id="{78C97017-6FC3-485B-9764-EAC9E56C1D49}" type="datetimeFigureOut">
               <a:rPr lang="en-US" smtClean="0"/>
-              <a:t>3/29/2019</a:t>
+              <a:t>4/13/2019</a:t>
             </a:fld>
             <a:endParaRPr lang="en-US"/>
           </a:p>
@@ -1782,7 +1782,7 @@
           <a:p>
             <a:fld id="{78C97017-6FC3-485B-9764-EAC9E56C1D49}" type="datetimeFigureOut">
               <a:rPr lang="en-US" smtClean="0"/>
-              <a:t>3/29/2019</a:t>
+              <a:t>4/13/2019</a:t>
             </a:fld>
             <a:endParaRPr lang="en-US"/>
           </a:p>
@@ -2201,7 +2201,7 @@
           <a:p>
             <a:fld id="{78C97017-6FC3-485B-9764-EAC9E56C1D49}" type="datetimeFigureOut">
               <a:rPr lang="en-US" smtClean="0"/>
-              <a:t>3/29/2019</a:t>
+              <a:t>4/13/2019</a:t>
             </a:fld>
             <a:endParaRPr lang="en-US"/>
           </a:p>
@@ -2318,7 +2318,7 @@
           <a:p>
             <a:fld id="{78C97017-6FC3-485B-9764-EAC9E56C1D49}" type="datetimeFigureOut">
               <a:rPr lang="en-US" smtClean="0"/>
-              <a:t>3/29/2019</a:t>
+              <a:t>4/13/2019</a:t>
             </a:fld>
             <a:endParaRPr lang="en-US"/>
           </a:p>
@@ -2413,7 +2413,7 @@
           <a:p>
             <a:fld id="{78C97017-6FC3-485B-9764-EAC9E56C1D49}" type="datetimeFigureOut">
               <a:rPr lang="en-US" smtClean="0"/>
-              <a:t>3/29/2019</a:t>
+              <a:t>4/13/2019</a:t>
             </a:fld>
             <a:endParaRPr lang="en-US"/>
           </a:p>
@@ -2688,7 +2688,7 @@
           <a:p>
             <a:fld id="{78C97017-6FC3-485B-9764-EAC9E56C1D49}" type="datetimeFigureOut">
               <a:rPr lang="en-US" smtClean="0"/>
-              <a:t>3/29/2019</a:t>
+              <a:t>4/13/2019</a:t>
             </a:fld>
             <a:endParaRPr lang="en-US"/>
           </a:p>
@@ -2940,7 +2940,7 @@
           <a:p>
             <a:fld id="{78C97017-6FC3-485B-9764-EAC9E56C1D49}" type="datetimeFigureOut">
               <a:rPr lang="en-US" smtClean="0"/>
-              <a:t>3/29/2019</a:t>
+              <a:t>4/13/2019</a:t>
             </a:fld>
             <a:endParaRPr lang="en-US"/>
           </a:p>
@@ -3151,7 +3151,7 @@
           <a:p>
             <a:fld id="{78C97017-6FC3-485B-9764-EAC9E56C1D49}" type="datetimeFigureOut">
               <a:rPr lang="en-US" smtClean="0"/>
-              <a:t>3/29/2019</a:t>
+              <a:t>4/13/2019</a:t>
             </a:fld>
             <a:endParaRPr lang="en-US"/>
           </a:p>
@@ -3534,8 +3534,8 @@
         </p:nvSpPr>
         <p:spPr>
           <a:xfrm>
-            <a:off x="-2467895" y="700651"/>
-            <a:ext cx="12545603" cy="5160741"/>
+            <a:off x="-2362200" y="762002"/>
+            <a:ext cx="12439908" cy="4724390"/>
           </a:xfrm>
           <a:prstGeom prst="roundRect">
             <a:avLst>
@@ -4053,8 +4053,8 @@
         </p:nvSpPr>
         <p:spPr>
           <a:xfrm>
-            <a:off x="-3407830" y="1619681"/>
-            <a:ext cx="1847297" cy="430887"/>
+            <a:off x="-2935986" y="1619681"/>
+            <a:ext cx="1375453" cy="430887"/>
           </a:xfrm>
           <a:prstGeom prst="rect">
             <a:avLst/>
@@ -4239,13 +4239,15 @@
       <p:cxnSp>
         <p:nvCxnSpPr>
           <p:cNvPr id="37" name="Straight Arrow Connector 36"/>
-          <p:cNvCxnSpPr/>
+          <p:cNvCxnSpPr>
+            <a:cxnSpLocks/>
+          </p:cNvCxnSpPr>
           <p:nvPr/>
         </p:nvCxnSpPr>
         <p:spPr>
           <a:xfrm>
-            <a:off x="-2691982" y="5105400"/>
-            <a:ext cx="1196051" cy="0"/>
+            <a:off x="-2438400" y="5105400"/>
+            <a:ext cx="942469" cy="0"/>
           </a:xfrm>
           <a:prstGeom prst="straightConnector1">
             <a:avLst/>
@@ -4326,7 +4328,7 @@
         </p:nvSpPr>
         <p:spPr>
           <a:xfrm>
-            <a:off x="-2572622" y="4889956"/>
+            <a:off x="-2362200" y="4889956"/>
             <a:ext cx="762000" cy="215444"/>
           </a:xfrm>
           <a:prstGeom prst="rect">
@@ -5449,8 +5451,8 @@
         </p:nvSpPr>
         <p:spPr>
           <a:xfrm>
-            <a:off x="10164833" y="688246"/>
-            <a:ext cx="1329194" cy="5160741"/>
+            <a:off x="10164833" y="762002"/>
+            <a:ext cx="1121664" cy="4724390"/>
           </a:xfrm>
           <a:prstGeom prst="roundRect">
             <a:avLst>

</xml_diff>

<commit_message>
Update SearchCommandSequenceDiagram and DG
</commit_message>
<xml_diff>
--- a/docs/diagrams/Command_Search_SequenceDiagram.pptx
+++ b/docs/diagrams/Command_Search_SequenceDiagram.pptx
@@ -208,7 +208,7 @@
           <a:p>
             <a:fld id="{F5CC4B3F-88C1-4FFA-B1B6-F41C21DC6924}" type="datetimeFigureOut">
               <a:rPr lang="en-US" smtClean="0"/>
-              <a:t>4/13/2019</a:t>
+              <a:t>4/15/2019</a:t>
             </a:fld>
             <a:endParaRPr lang="en-US"/>
           </a:p>
@@ -738,7 +738,7 @@
           <a:p>
             <a:fld id="{78C97017-6FC3-485B-9764-EAC9E56C1D49}" type="datetimeFigureOut">
               <a:rPr lang="en-US" smtClean="0"/>
-              <a:t>4/13/2019</a:t>
+              <a:t>4/15/2019</a:t>
             </a:fld>
             <a:endParaRPr lang="en-US"/>
           </a:p>
@@ -906,7 +906,7 @@
           <a:p>
             <a:fld id="{78C97017-6FC3-485B-9764-EAC9E56C1D49}" type="datetimeFigureOut">
               <a:rPr lang="en-US" smtClean="0"/>
-              <a:t>4/13/2019</a:t>
+              <a:t>4/15/2019</a:t>
             </a:fld>
             <a:endParaRPr lang="en-US"/>
           </a:p>
@@ -1084,7 +1084,7 @@
           <a:p>
             <a:fld id="{78C97017-6FC3-485B-9764-EAC9E56C1D49}" type="datetimeFigureOut">
               <a:rPr lang="en-US" smtClean="0"/>
-              <a:t>4/13/2019</a:t>
+              <a:t>4/15/2019</a:t>
             </a:fld>
             <a:endParaRPr lang="en-US"/>
           </a:p>
@@ -1252,7 +1252,7 @@
           <a:p>
             <a:fld id="{78C97017-6FC3-485B-9764-EAC9E56C1D49}" type="datetimeFigureOut">
               <a:rPr lang="en-US" smtClean="0"/>
-              <a:t>4/13/2019</a:t>
+              <a:t>4/15/2019</a:t>
             </a:fld>
             <a:endParaRPr lang="en-US"/>
           </a:p>
@@ -1497,7 +1497,7 @@
           <a:p>
             <a:fld id="{78C97017-6FC3-485B-9764-EAC9E56C1D49}" type="datetimeFigureOut">
               <a:rPr lang="en-US" smtClean="0"/>
-              <a:t>4/13/2019</a:t>
+              <a:t>4/15/2019</a:t>
             </a:fld>
             <a:endParaRPr lang="en-US"/>
           </a:p>
@@ -1782,7 +1782,7 @@
           <a:p>
             <a:fld id="{78C97017-6FC3-485B-9764-EAC9E56C1D49}" type="datetimeFigureOut">
               <a:rPr lang="en-US" smtClean="0"/>
-              <a:t>4/13/2019</a:t>
+              <a:t>4/15/2019</a:t>
             </a:fld>
             <a:endParaRPr lang="en-US"/>
           </a:p>
@@ -2201,7 +2201,7 @@
           <a:p>
             <a:fld id="{78C97017-6FC3-485B-9764-EAC9E56C1D49}" type="datetimeFigureOut">
               <a:rPr lang="en-US" smtClean="0"/>
-              <a:t>4/13/2019</a:t>
+              <a:t>4/15/2019</a:t>
             </a:fld>
             <a:endParaRPr lang="en-US"/>
           </a:p>
@@ -2318,7 +2318,7 @@
           <a:p>
             <a:fld id="{78C97017-6FC3-485B-9764-EAC9E56C1D49}" type="datetimeFigureOut">
               <a:rPr lang="en-US" smtClean="0"/>
-              <a:t>4/13/2019</a:t>
+              <a:t>4/15/2019</a:t>
             </a:fld>
             <a:endParaRPr lang="en-US"/>
           </a:p>
@@ -2413,7 +2413,7 @@
           <a:p>
             <a:fld id="{78C97017-6FC3-485B-9764-EAC9E56C1D49}" type="datetimeFigureOut">
               <a:rPr lang="en-US" smtClean="0"/>
-              <a:t>4/13/2019</a:t>
+              <a:t>4/15/2019</a:t>
             </a:fld>
             <a:endParaRPr lang="en-US"/>
           </a:p>
@@ -2688,7 +2688,7 @@
           <a:p>
             <a:fld id="{78C97017-6FC3-485B-9764-EAC9E56C1D49}" type="datetimeFigureOut">
               <a:rPr lang="en-US" smtClean="0"/>
-              <a:t>4/13/2019</a:t>
+              <a:t>4/15/2019</a:t>
             </a:fld>
             <a:endParaRPr lang="en-US"/>
           </a:p>
@@ -2940,7 +2940,7 @@
           <a:p>
             <a:fld id="{78C97017-6FC3-485B-9764-EAC9E56C1D49}" type="datetimeFigureOut">
               <a:rPr lang="en-US" smtClean="0"/>
-              <a:t>4/13/2019</a:t>
+              <a:t>4/15/2019</a:t>
             </a:fld>
             <a:endParaRPr lang="en-US"/>
           </a:p>
@@ -3151,7 +3151,7 @@
           <a:p>
             <a:fld id="{78C97017-6FC3-485B-9764-EAC9E56C1D49}" type="datetimeFigureOut">
               <a:rPr lang="en-US" smtClean="0"/>
-              <a:t>4/13/2019</a:t>
+              <a:t>4/15/2019</a:t>
             </a:fld>
             <a:endParaRPr lang="en-US"/>
           </a:p>
@@ -4370,7 +4370,7 @@
         </p:nvCxnSpPr>
         <p:spPr>
           <a:xfrm flipV="1">
-            <a:off x="1153379" y="2604807"/>
+            <a:off x="1143546" y="2555836"/>
             <a:ext cx="2704661" cy="14528"/>
           </a:xfrm>
           <a:prstGeom prst="straightConnector1">

</xml_diff>